<commit_message>
Add centre field for MVP/Ideation findings
</commit_message>
<xml_diff>
--- a/Open Source Canvas Alpha.pptx
+++ b/Open Source Canvas Alpha.pptx
@@ -222,7 +222,7 @@
           <a:p>
             <a:fld id="{7BDB706A-95EB-FF43-8358-75EF4D00F4A9}" type="datetimeFigureOut">
               <a:rPr lang="en-US" smtClean="0"/>
-              <a:t>8/14/17</a:t>
+              <a:t>8/21/17</a:t>
             </a:fld>
             <a:endParaRPr lang="en-US"/>
           </a:p>
@@ -388,7 +388,7 @@
           <a:p>
             <a:fld id="{07996129-0583-2544-9A80-4530EBDB0541}" type="datetimeFigureOut">
               <a:rPr lang="en-US" smtClean="0"/>
-              <a:t>8/14/17</a:t>
+              <a:t>8/21/17</a:t>
             </a:fld>
             <a:endParaRPr lang="en-US"/>
           </a:p>
@@ -825,7 +825,7 @@
                 <a:buFont typeface="Arial"/>
                 <a:buNone/>
               </a:pPr>
-              <a:t>8/14/17</a:t>
+              <a:t>8/21/17</a:t>
             </a:fld>
             <a:endParaRPr lang="en-US" dirty="0"/>
           </a:p>
@@ -5008,7 +5008,7 @@
                 <a:buFont typeface="Arial"/>
                 <a:buNone/>
               </a:pPr>
-              <a:t>8/14/17</a:t>
+              <a:t>8/21/17</a:t>
             </a:fld>
             <a:endParaRPr lang="en-US" dirty="0"/>
           </a:p>
@@ -9126,7 +9126,7 @@
                 <a:buFont typeface="Arial"/>
                 <a:buNone/>
               </a:pPr>
-              <a:t>8/14/17</a:t>
+              <a:t>8/21/17</a:t>
             </a:fld>
             <a:endParaRPr lang="en-US" dirty="0"/>
           </a:p>
@@ -11804,7 +11804,7 @@
                 <a:buFont typeface="Arial"/>
                 <a:buNone/>
               </a:pPr>
-              <a:t>8/14/17</a:t>
+              <a:t>8/21/17</a:t>
             </a:fld>
             <a:endParaRPr lang="en-US" dirty="0"/>
           </a:p>
@@ -15767,7 +15767,7 @@
                 <a:buFont typeface="Arial"/>
                 <a:buNone/>
               </a:pPr>
-              <a:t>8/14/17</a:t>
+              <a:t>8/21/17</a:t>
             </a:fld>
             <a:endParaRPr lang="en-US" dirty="0"/>
           </a:p>
@@ -16335,7 +16335,7 @@
                 <a:buFont typeface="Arial"/>
                 <a:buNone/>
               </a:pPr>
-              <a:t>8/14/17</a:t>
+              <a:t>8/21/17</a:t>
             </a:fld>
             <a:endParaRPr lang="en-US" dirty="0"/>
           </a:p>
@@ -16513,7 +16513,7 @@
                 <a:buFont typeface="Arial"/>
                 <a:buNone/>
               </a:pPr>
-              <a:t>8/14/17</a:t>
+              <a:t>8/21/17</a:t>
             </a:fld>
             <a:endParaRPr lang="en-US" dirty="0"/>
           </a:p>
@@ -16697,7 +16697,7 @@
                 <a:buFont typeface="Arial"/>
                 <a:buNone/>
               </a:pPr>
-              <a:t>8/14/17</a:t>
+              <a:t>8/21/17</a:t>
             </a:fld>
             <a:endParaRPr lang="en-US" dirty="0"/>
           </a:p>
@@ -16873,7 +16873,7 @@
                 <a:buFont typeface="Arial"/>
                 <a:buNone/>
               </a:pPr>
-              <a:t>8/14/17</a:t>
+              <a:t>8/21/17</a:t>
             </a:fld>
             <a:endParaRPr lang="en-US" dirty="0"/>
           </a:p>
@@ -17208,7 +17208,7 @@
                 <a:buFont typeface="Arial"/>
                 <a:buNone/>
               </a:pPr>
-              <a:t>8/14/17</a:t>
+              <a:t>8/21/17</a:t>
             </a:fld>
             <a:endParaRPr lang="en-US" dirty="0"/>
           </a:p>
@@ -17426,7 +17426,7 @@
                 <a:buFont typeface="Arial"/>
                 <a:buNone/>
               </a:pPr>
-              <a:t>8/14/17</a:t>
+              <a:t>8/21/17</a:t>
             </a:fld>
             <a:endParaRPr lang="en-US" dirty="0"/>
           </a:p>
@@ -17761,7 +17761,7 @@
                 <a:buFont typeface="Arial"/>
                 <a:buNone/>
               </a:pPr>
-              <a:t>8/14/17</a:t>
+              <a:t>8/21/17</a:t>
             </a:fld>
             <a:endParaRPr lang="en-US" dirty="0"/>
           </a:p>
@@ -32412,7 +32412,7 @@
           <p:nvPr>
             <p:extLst>
               <p:ext uri="{D42A27DB-BD31-4B8C-83A1-F6EECF244321}">
-                <p14:modId xmlns:p14="http://schemas.microsoft.com/office/powerpoint/2010/main" val="2059457181"/>
+                <p14:modId xmlns:p14="http://schemas.microsoft.com/office/powerpoint/2010/main" val="2028313242"/>
               </p:ext>
             </p:extLst>
           </p:nvPr>
@@ -32483,7 +32483,13 @@
                         <a:rPr lang="en-US" sz="1500" dirty="0" smtClean="0">
                           <a:latin typeface="+mj-lt"/>
                         </a:rPr>
-                        <a:t>This is where our </a:t>
+                        <a:t>This </a:t>
+                      </a:r>
+                      <a:r>
+                        <a:rPr lang="en-US" sz="1500" dirty="0" smtClean="0">
+                          <a:latin typeface="+mj-lt"/>
+                        </a:rPr>
+                        <a:t>is where our </a:t>
                       </a:r>
                       <a:r>
                         <a:rPr lang="en-US" sz="1500" b="0" i="0" dirty="0" smtClean="0">
@@ -32831,7 +32837,25 @@
                         <a:rPr lang="en-US" sz="1500" dirty="0" smtClean="0">
                           <a:latin typeface="+mj-lt"/>
                         </a:rPr>
-                        <a:t>Things we can open source</a:t>
+                        <a:t>Things </a:t>
+                      </a:r>
+                      <a:r>
+                        <a:rPr lang="en-US" sz="1500" dirty="0" smtClean="0">
+                          <a:latin typeface="+mj-lt"/>
+                        </a:rPr>
+                        <a:t>we</a:t>
+                      </a:r>
+                      <a:r>
+                        <a:rPr lang="en-US" sz="1500" baseline="0" dirty="0" smtClean="0">
+                          <a:latin typeface="+mj-lt"/>
+                        </a:rPr>
+                        <a:t> </a:t>
+                      </a:r>
+                      <a:r>
+                        <a:rPr lang="en-US" sz="1500" dirty="0" smtClean="0">
+                          <a:latin typeface="+mj-lt"/>
+                        </a:rPr>
+                        <a:t>can open source</a:t>
                       </a:r>
                       <a:endParaRPr lang="en-US" sz="1500" dirty="0">
                         <a:latin typeface="+mj-lt"/>
@@ -32900,8 +32924,8 @@
         </p:nvGrpSpPr>
         <p:grpSpPr>
           <a:xfrm>
-            <a:off x="160638" y="12401534"/>
-            <a:ext cx="4028590" cy="415498"/>
+            <a:off x="160636" y="12404640"/>
+            <a:ext cx="4179352" cy="415498"/>
             <a:chOff x="331261" y="9593345"/>
             <a:chExt cx="2750311" cy="322753"/>
           </a:xfrm>
@@ -33016,9 +33040,479 @@
           </p:txBody>
         </p:sp>
       </p:grpSp>
+      <p:sp>
+        <p:nvSpPr>
+          <p:cNvPr id="14" name="TextBox 13"/>
+          <p:cNvSpPr txBox="1"/>
+          <p:nvPr/>
+        </p:nvSpPr>
+        <p:spPr>
+          <a:xfrm>
+            <a:off x="3593324" y="1608139"/>
+            <a:ext cx="2466091" cy="552249"/>
+          </a:xfrm>
+          <a:prstGeom prst="rect">
+            <a:avLst/>
+          </a:prstGeom>
+          <a:solidFill>
+            <a:schemeClr val="bg1"/>
+          </a:solidFill>
+        </p:spPr>
+        <p:txBody>
+          <a:bodyPr wrap="none" lIns="120189" tIns="60094" rIns="120189" bIns="60094" rtlCol="0">
+            <a:spAutoFit/>
+          </a:bodyPr>
+          <a:lstStyle/>
+          <a:p>
+            <a:r>
+              <a:rPr lang="en-US" sz="2800" dirty="0" smtClean="0">
+                <a:latin typeface="+mj-lt"/>
+              </a:rPr>
+              <a:t>PROPRIETARY</a:t>
+            </a:r>
+            <a:endParaRPr lang="en-US" sz="2800" dirty="0">
+              <a:latin typeface="+mj-lt"/>
+            </a:endParaRPr>
+          </a:p>
+        </p:txBody>
+      </p:sp>
+      <p:sp>
+        <p:nvSpPr>
+          <p:cNvPr id="15" name="TextBox 14"/>
+          <p:cNvSpPr txBox="1"/>
+          <p:nvPr/>
+        </p:nvSpPr>
+        <p:spPr>
+          <a:xfrm>
+            <a:off x="3536470" y="11004290"/>
+            <a:ext cx="2565477" cy="552249"/>
+          </a:xfrm>
+          <a:prstGeom prst="rect">
+            <a:avLst/>
+          </a:prstGeom>
+          <a:solidFill>
+            <a:schemeClr val="bg1"/>
+          </a:solidFill>
+        </p:spPr>
+        <p:txBody>
+          <a:bodyPr wrap="none" lIns="120189" tIns="60094" rIns="120189" bIns="60094" rtlCol="0">
+            <a:spAutoFit/>
+          </a:bodyPr>
+          <a:lstStyle/>
+          <a:p>
+            <a:r>
+              <a:rPr lang="en-US" sz="2800" dirty="0" smtClean="0">
+                <a:latin typeface="+mj-lt"/>
+              </a:rPr>
+              <a:t>OPEN SOURCE</a:t>
+            </a:r>
+            <a:endParaRPr lang="en-US" sz="2800" dirty="0">
+              <a:latin typeface="+mj-lt"/>
+            </a:endParaRPr>
+          </a:p>
+        </p:txBody>
+      </p:sp>
+      <p:sp>
+        <p:nvSpPr>
+          <p:cNvPr id="16" name="TextBox 15"/>
+          <p:cNvSpPr txBox="1"/>
+          <p:nvPr/>
+        </p:nvSpPr>
+        <p:spPr>
+          <a:xfrm>
+            <a:off x="7952550" y="6080190"/>
+            <a:ext cx="1539555" cy="490694"/>
+          </a:xfrm>
+          <a:prstGeom prst="rect">
+            <a:avLst/>
+          </a:prstGeom>
+          <a:noFill/>
+        </p:spPr>
+        <p:txBody>
+          <a:bodyPr wrap="none" lIns="120189" tIns="60094" rIns="120189" bIns="60094" rtlCol="0">
+            <a:spAutoFit/>
+          </a:bodyPr>
+          <a:lstStyle/>
+          <a:p>
+            <a:r>
+              <a:rPr lang="en-US" dirty="0" smtClean="0">
+                <a:latin typeface="+mj-lt"/>
+              </a:rPr>
+              <a:t>WE BUILD</a:t>
+            </a:r>
+            <a:endParaRPr lang="en-US" dirty="0">
+              <a:latin typeface="+mj-lt"/>
+            </a:endParaRPr>
+          </a:p>
+        </p:txBody>
+      </p:sp>
+      <p:sp>
+        <p:nvSpPr>
+          <p:cNvPr id="18" name="TextBox 17"/>
+          <p:cNvSpPr txBox="1"/>
+          <p:nvPr/>
+        </p:nvSpPr>
+        <p:spPr>
+          <a:xfrm>
+            <a:off x="160636" y="6046447"/>
+            <a:ext cx="2182359" cy="490694"/>
+          </a:xfrm>
+          <a:prstGeom prst="rect">
+            <a:avLst/>
+          </a:prstGeom>
+          <a:noFill/>
+        </p:spPr>
+        <p:txBody>
+          <a:bodyPr wrap="none" lIns="120189" tIns="60094" rIns="120189" bIns="60094" rtlCol="0">
+            <a:spAutoFit/>
+          </a:bodyPr>
+          <a:lstStyle/>
+          <a:p>
+            <a:r>
+              <a:rPr lang="en-US" dirty="0" smtClean="0">
+                <a:latin typeface="+mj-lt"/>
+              </a:rPr>
+              <a:t>OTHERS BUILD</a:t>
+            </a:r>
+            <a:endParaRPr lang="en-US" dirty="0">
+              <a:latin typeface="+mj-lt"/>
+            </a:endParaRPr>
+          </a:p>
+        </p:txBody>
+      </p:sp>
+      <p:sp>
+        <p:nvSpPr>
+          <p:cNvPr id="19" name="TextBox 18"/>
+          <p:cNvSpPr txBox="1"/>
+          <p:nvPr/>
+        </p:nvSpPr>
+        <p:spPr>
+          <a:xfrm>
+            <a:off x="6076007" y="12186159"/>
+            <a:ext cx="3416098" cy="490694"/>
+          </a:xfrm>
+          <a:prstGeom prst="rect">
+            <a:avLst/>
+          </a:prstGeom>
+          <a:noFill/>
+        </p:spPr>
+        <p:txBody>
+          <a:bodyPr wrap="square" lIns="120189" tIns="60094" rIns="120189" bIns="60094" rtlCol="0">
+            <a:spAutoFit/>
+          </a:bodyPr>
+          <a:lstStyle/>
+          <a:p>
+            <a:pPr algn="r"/>
+            <a:r>
+              <a:rPr lang="en-US" smtClean="0">
+                <a:solidFill>
+                  <a:schemeClr val="accent6"/>
+                </a:solidFill>
+                <a:latin typeface="+mj-lt"/>
+              </a:rPr>
+              <a:t>ALPHA </a:t>
+            </a:r>
+            <a:r>
+              <a:rPr lang="en-US" dirty="0" smtClean="0">
+                <a:solidFill>
+                  <a:schemeClr val="accent6"/>
+                </a:solidFill>
+                <a:latin typeface="+mj-lt"/>
+              </a:rPr>
+              <a:t>CANVAS</a:t>
+            </a:r>
+            <a:endParaRPr lang="en-US" dirty="0">
+              <a:solidFill>
+                <a:schemeClr val="accent6"/>
+              </a:solidFill>
+              <a:latin typeface="+mj-lt"/>
+            </a:endParaRPr>
+          </a:p>
+        </p:txBody>
+      </p:sp>
+      <p:graphicFrame>
+        <p:nvGraphicFramePr>
+          <p:cNvPr id="17" name="Table 16"/>
+          <p:cNvGraphicFramePr>
+            <a:graphicFrameLocks noGrp="1"/>
+          </p:cNvGraphicFramePr>
+          <p:nvPr>
+            <p:extLst>
+              <p:ext uri="{D42A27DB-BD31-4B8C-83A1-F6EECF244321}">
+                <p14:modId xmlns:p14="http://schemas.microsoft.com/office/powerpoint/2010/main" val="1391693987"/>
+              </p:ext>
+            </p:extLst>
+          </p:nvPr>
+        </p:nvGraphicFramePr>
+        <p:xfrm>
+          <a:off x="3001041" y="4394579"/>
+          <a:ext cx="3636334" cy="4221908"/>
+        </p:xfrm>
+        <a:graphic>
+          <a:graphicData uri="http://schemas.openxmlformats.org/drawingml/2006/table">
+            <a:tbl>
+              <a:tblPr firstRow="1" bandRow="1">
+                <a:tableStyleId>{2D5ABB26-0587-4C30-8999-92F81FD0307C}</a:tableStyleId>
+              </a:tblPr>
+              <a:tblGrid>
+                <a:gridCol w="3636334"/>
+              </a:tblGrid>
+              <a:tr h="4221908">
+                <a:tc>
+                  <a:txBody>
+                    <a:bodyPr/>
+                    <a:lstStyle/>
+                    <a:p>
+                      <a:pPr algn="ctr"/>
+                      <a:r>
+                        <a:rPr lang="en-US" sz="1800" baseline="0" smtClean="0">
+                          <a:latin typeface="+mj-lt"/>
+                        </a:rPr>
+                        <a:t>Features</a:t>
+                      </a:r>
+                    </a:p>
+                    <a:p>
+                      <a:pPr algn="ctr"/>
+                      <a:r>
+                        <a:rPr lang="en-US" sz="1200" b="0" i="0" baseline="0" smtClean="0">
+                          <a:latin typeface="Sharp Sans No1 Light" charset="0"/>
+                          <a:ea typeface="Sharp Sans No1 Light" charset="0"/>
+                          <a:cs typeface="Sharp Sans No1 Light" charset="0"/>
+                        </a:rPr>
+                        <a:t>Place Ideation &amp; MVP canvas findings here </a:t>
+                      </a:r>
+                    </a:p>
+                    <a:p>
+                      <a:pPr algn="ctr"/>
+                      <a:endParaRPr lang="en-US" sz="1200" b="0" i="0" baseline="0" smtClean="0">
+                        <a:latin typeface="Sharp Sans No1 Light" charset="0"/>
+                        <a:ea typeface="Sharp Sans No1 Light" charset="0"/>
+                        <a:cs typeface="Sharp Sans No1 Light" charset="0"/>
+                      </a:endParaRPr>
+                    </a:p>
+                    <a:p>
+                      <a:pPr algn="ctr"/>
+                      <a:endParaRPr lang="en-US" sz="1200" b="0" i="0" baseline="0" smtClean="0">
+                        <a:latin typeface="Sharp Sans No1 Light" charset="0"/>
+                        <a:ea typeface="Sharp Sans No1 Light" charset="0"/>
+                        <a:cs typeface="Sharp Sans No1 Light" charset="0"/>
+                      </a:endParaRPr>
+                    </a:p>
+                    <a:p>
+                      <a:pPr algn="ctr"/>
+                      <a:endParaRPr lang="en-US" sz="1200" b="0" i="0" baseline="0" smtClean="0">
+                        <a:latin typeface="Sharp Sans No1 Light" charset="0"/>
+                        <a:ea typeface="Sharp Sans No1 Light" charset="0"/>
+                        <a:cs typeface="Sharp Sans No1 Light" charset="0"/>
+                      </a:endParaRPr>
+                    </a:p>
+                    <a:p>
+                      <a:pPr algn="ctr"/>
+                      <a:endParaRPr lang="en-US" sz="1200" b="0" i="0" baseline="0" smtClean="0">
+                        <a:latin typeface="Sharp Sans No1 Light" charset="0"/>
+                        <a:ea typeface="Sharp Sans No1 Light" charset="0"/>
+                        <a:cs typeface="Sharp Sans No1 Light" charset="0"/>
+                      </a:endParaRPr>
+                    </a:p>
+                    <a:p>
+                      <a:pPr algn="ctr"/>
+                      <a:endParaRPr lang="en-US" sz="1200" b="0" i="0" baseline="0" smtClean="0">
+                        <a:latin typeface="Sharp Sans No1 Light" charset="0"/>
+                        <a:ea typeface="Sharp Sans No1 Light" charset="0"/>
+                        <a:cs typeface="Sharp Sans No1 Light" charset="0"/>
+                      </a:endParaRPr>
+                    </a:p>
+                    <a:p>
+                      <a:pPr algn="ctr"/>
+                      <a:endParaRPr lang="en-US" sz="1200" b="0" i="0" baseline="0" smtClean="0">
+                        <a:latin typeface="Sharp Sans No1 Light" charset="0"/>
+                        <a:ea typeface="Sharp Sans No1 Light" charset="0"/>
+                        <a:cs typeface="Sharp Sans No1 Light" charset="0"/>
+                      </a:endParaRPr>
+                    </a:p>
+                    <a:p>
+                      <a:pPr algn="ctr"/>
+                      <a:endParaRPr lang="en-US" sz="1200" b="0" i="0" baseline="0" smtClean="0">
+                        <a:latin typeface="Sharp Sans No1 Light" charset="0"/>
+                        <a:ea typeface="Sharp Sans No1 Light" charset="0"/>
+                        <a:cs typeface="Sharp Sans No1 Light" charset="0"/>
+                      </a:endParaRPr>
+                    </a:p>
+                    <a:p>
+                      <a:pPr algn="ctr"/>
+                      <a:endParaRPr lang="en-US" sz="1200" b="0" i="0" baseline="0" smtClean="0">
+                        <a:latin typeface="Sharp Sans No1 Light" charset="0"/>
+                        <a:ea typeface="Sharp Sans No1 Light" charset="0"/>
+                        <a:cs typeface="Sharp Sans No1 Light" charset="0"/>
+                      </a:endParaRPr>
+                    </a:p>
+                    <a:p>
+                      <a:pPr algn="ctr"/>
+                      <a:endParaRPr lang="en-US" sz="1200" b="0" i="0" baseline="0" smtClean="0">
+                        <a:latin typeface="Sharp Sans No1 Light" charset="0"/>
+                        <a:ea typeface="Sharp Sans No1 Light" charset="0"/>
+                        <a:cs typeface="Sharp Sans No1 Light" charset="0"/>
+                      </a:endParaRPr>
+                    </a:p>
+                    <a:p>
+                      <a:pPr algn="ctr"/>
+                      <a:endParaRPr lang="en-US" sz="1200" b="0" i="0" baseline="0" smtClean="0">
+                        <a:latin typeface="Sharp Sans No1 Light" charset="0"/>
+                        <a:ea typeface="Sharp Sans No1 Light" charset="0"/>
+                        <a:cs typeface="Sharp Sans No1 Light" charset="0"/>
+                      </a:endParaRPr>
+                    </a:p>
+                    <a:p>
+                      <a:pPr algn="ctr"/>
+                      <a:endParaRPr lang="en-US" sz="1200" b="0" i="0" baseline="0" smtClean="0">
+                        <a:latin typeface="Sharp Sans No1 Light" charset="0"/>
+                        <a:ea typeface="Sharp Sans No1 Light" charset="0"/>
+                        <a:cs typeface="Sharp Sans No1 Light" charset="0"/>
+                      </a:endParaRPr>
+                    </a:p>
+                    <a:p>
+                      <a:pPr algn="ctr"/>
+                      <a:endParaRPr lang="en-US" sz="1200" b="0" i="0" baseline="0" smtClean="0">
+                        <a:latin typeface="Sharp Sans No1 Light" charset="0"/>
+                        <a:ea typeface="Sharp Sans No1 Light" charset="0"/>
+                        <a:cs typeface="Sharp Sans No1 Light" charset="0"/>
+                      </a:endParaRPr>
+                    </a:p>
+                    <a:p>
+                      <a:pPr algn="ctr"/>
+                      <a:endParaRPr lang="en-US" sz="1200" b="0" i="0" baseline="0" smtClean="0">
+                        <a:latin typeface="Sharp Sans No1 Light" charset="0"/>
+                        <a:ea typeface="Sharp Sans No1 Light" charset="0"/>
+                        <a:cs typeface="Sharp Sans No1 Light" charset="0"/>
+                      </a:endParaRPr>
+                    </a:p>
+                    <a:p>
+                      <a:pPr algn="ctr"/>
+                      <a:endParaRPr lang="en-US" sz="1200" b="0" i="0" baseline="0" smtClean="0">
+                        <a:latin typeface="Sharp Sans No1 Light" charset="0"/>
+                        <a:ea typeface="Sharp Sans No1 Light" charset="0"/>
+                        <a:cs typeface="Sharp Sans No1 Light" charset="0"/>
+                      </a:endParaRPr>
+                    </a:p>
+                    <a:p>
+                      <a:pPr algn="ctr"/>
+                      <a:endParaRPr lang="en-US" sz="1200" b="0" i="0" baseline="0" smtClean="0">
+                        <a:latin typeface="Sharp Sans No1 Light" charset="0"/>
+                        <a:ea typeface="Sharp Sans No1 Light" charset="0"/>
+                        <a:cs typeface="Sharp Sans No1 Light" charset="0"/>
+                      </a:endParaRPr>
+                    </a:p>
+                    <a:p>
+                      <a:pPr algn="ctr"/>
+                      <a:endParaRPr lang="en-US" sz="1200" b="0" i="0" baseline="0" smtClean="0">
+                        <a:latin typeface="Sharp Sans No1 Light" charset="0"/>
+                        <a:ea typeface="Sharp Sans No1 Light" charset="0"/>
+                        <a:cs typeface="Sharp Sans No1 Light" charset="0"/>
+                      </a:endParaRPr>
+                    </a:p>
+                    <a:p>
+                      <a:pPr algn="ctr"/>
+                      <a:endParaRPr lang="en-US" sz="1200" b="0" i="0" baseline="0" smtClean="0">
+                        <a:latin typeface="Sharp Sans No1 Light" charset="0"/>
+                        <a:ea typeface="Sharp Sans No1 Light" charset="0"/>
+                        <a:cs typeface="Sharp Sans No1 Light" charset="0"/>
+                      </a:endParaRPr>
+                    </a:p>
+                    <a:p>
+                      <a:pPr algn="ctr"/>
+                      <a:endParaRPr lang="en-US" sz="1200" b="0" i="0" baseline="0" smtClean="0">
+                        <a:latin typeface="Sharp Sans No1 Light" charset="0"/>
+                        <a:ea typeface="Sharp Sans No1 Light" charset="0"/>
+                        <a:cs typeface="Sharp Sans No1 Light" charset="0"/>
+                      </a:endParaRPr>
+                    </a:p>
+                    <a:p>
+                      <a:pPr algn="ctr"/>
+                      <a:endParaRPr lang="en-US" sz="1200" b="0" i="0" baseline="0" smtClean="0">
+                        <a:latin typeface="Sharp Sans No1 Light" charset="0"/>
+                        <a:ea typeface="Sharp Sans No1 Light" charset="0"/>
+                        <a:cs typeface="Sharp Sans No1 Light" charset="0"/>
+                      </a:endParaRPr>
+                    </a:p>
+                    <a:p>
+                      <a:pPr algn="ctr"/>
+                      <a:r>
+                        <a:rPr lang="en-US" sz="1200" b="0" i="0" baseline="0" smtClean="0">
+                          <a:latin typeface="Sharp Sans No1 Light" charset="0"/>
+                          <a:ea typeface="Sharp Sans No1 Light" charset="0"/>
+                          <a:cs typeface="Sharp Sans No1 Light" charset="0"/>
+                        </a:rPr>
+                        <a:t>Work outwards by discussing and categorising</a:t>
+                      </a:r>
+                      <a:endParaRPr lang="en-US" sz="1200" b="0" i="0" dirty="0">
+                        <a:latin typeface="Sharp Sans No1 Light" charset="0"/>
+                        <a:ea typeface="Sharp Sans No1 Light" charset="0"/>
+                        <a:cs typeface="Sharp Sans No1 Light" charset="0"/>
+                      </a:endParaRPr>
+                    </a:p>
+                  </a:txBody>
+                  <a:tcPr marL="83219" marR="83219" marT="39608" marB="39608">
+                    <a:lnL w="28575" cap="flat" cmpd="sng" algn="ctr">
+                      <a:solidFill>
+                        <a:schemeClr val="tx1">
+                          <a:lumMod val="50000"/>
+                          <a:lumOff val="50000"/>
+                        </a:schemeClr>
+                      </a:solidFill>
+                      <a:prstDash val="sysDash"/>
+                      <a:round/>
+                      <a:headEnd type="none" w="med" len="med"/>
+                      <a:tailEnd type="none" w="med" len="med"/>
+                    </a:lnL>
+                    <a:lnR w="28575" cap="flat" cmpd="sng" algn="ctr">
+                      <a:solidFill>
+                        <a:schemeClr val="tx1">
+                          <a:lumMod val="50000"/>
+                          <a:lumOff val="50000"/>
+                        </a:schemeClr>
+                      </a:solidFill>
+                      <a:prstDash val="sysDash"/>
+                      <a:round/>
+                      <a:headEnd type="none" w="med" len="med"/>
+                      <a:tailEnd type="none" w="med" len="med"/>
+                    </a:lnR>
+                    <a:lnT w="28575" cap="flat" cmpd="sng" algn="ctr">
+                      <a:solidFill>
+                        <a:schemeClr val="tx1">
+                          <a:lumMod val="50000"/>
+                          <a:lumOff val="50000"/>
+                        </a:schemeClr>
+                      </a:solidFill>
+                      <a:prstDash val="sysDash"/>
+                      <a:round/>
+                      <a:headEnd type="none" w="med" len="med"/>
+                      <a:tailEnd type="none" w="med" len="med"/>
+                    </a:lnT>
+                    <a:lnB w="28575" cap="flat" cmpd="sng" algn="ctr">
+                      <a:solidFill>
+                        <a:schemeClr val="tx1">
+                          <a:lumMod val="50000"/>
+                          <a:lumOff val="50000"/>
+                        </a:schemeClr>
+                      </a:solidFill>
+                      <a:prstDash val="sysDash"/>
+                      <a:round/>
+                      <a:headEnd type="none" w="med" len="med"/>
+                      <a:tailEnd type="none" w="med" len="med"/>
+                    </a:lnB>
+                    <a:solidFill>
+                      <a:schemeClr val="bg1"/>
+                    </a:solidFill>
+                  </a:tcPr>
+                </a:tc>
+              </a:tr>
+            </a:tbl>
+          </a:graphicData>
+        </a:graphic>
+      </p:graphicFrame>
       <p:pic>
         <p:nvPicPr>
-          <p:cNvPr id="2" name="Picture 1"/>
+          <p:cNvPr id="5" name="Picture 4"/>
           <p:cNvPicPr>
             <a:picLocks noChangeAspect="1"/>
           </p:cNvPicPr>
@@ -33038,194 +33532,14 @@
         </p:blipFill>
         <p:spPr>
           <a:xfrm>
-            <a:off x="3817088" y="5503295"/>
-            <a:ext cx="1967024" cy="1967024"/>
+            <a:off x="3940791" y="5645724"/>
+            <a:ext cx="1719618" cy="1719618"/>
           </a:xfrm>
           <a:prstGeom prst="rect">
             <a:avLst/>
           </a:prstGeom>
         </p:spPr>
       </p:pic>
-      <p:sp>
-        <p:nvSpPr>
-          <p:cNvPr id="14" name="TextBox 13"/>
-          <p:cNvSpPr txBox="1"/>
-          <p:nvPr/>
-        </p:nvSpPr>
-        <p:spPr>
-          <a:xfrm>
-            <a:off x="3593324" y="1608139"/>
-            <a:ext cx="2466091" cy="552249"/>
-          </a:xfrm>
-          <a:prstGeom prst="rect">
-            <a:avLst/>
-          </a:prstGeom>
-          <a:solidFill>
-            <a:schemeClr val="bg1"/>
-          </a:solidFill>
-        </p:spPr>
-        <p:txBody>
-          <a:bodyPr wrap="none" lIns="120189" tIns="60094" rIns="120189" bIns="60094" rtlCol="0">
-            <a:spAutoFit/>
-          </a:bodyPr>
-          <a:lstStyle/>
-          <a:p>
-            <a:r>
-              <a:rPr lang="en-US" sz="2800" dirty="0" smtClean="0">
-                <a:latin typeface="+mj-lt"/>
-              </a:rPr>
-              <a:t>PROPRIETARY</a:t>
-            </a:r>
-            <a:endParaRPr lang="en-US" sz="2800" dirty="0">
-              <a:latin typeface="+mj-lt"/>
-            </a:endParaRPr>
-          </a:p>
-        </p:txBody>
-      </p:sp>
-      <p:sp>
-        <p:nvSpPr>
-          <p:cNvPr id="15" name="TextBox 14"/>
-          <p:cNvSpPr txBox="1"/>
-          <p:nvPr/>
-        </p:nvSpPr>
-        <p:spPr>
-          <a:xfrm>
-            <a:off x="3536470" y="11004290"/>
-            <a:ext cx="2565477" cy="552249"/>
-          </a:xfrm>
-          <a:prstGeom prst="rect">
-            <a:avLst/>
-          </a:prstGeom>
-          <a:solidFill>
-            <a:schemeClr val="bg1"/>
-          </a:solidFill>
-        </p:spPr>
-        <p:txBody>
-          <a:bodyPr wrap="none" lIns="120189" tIns="60094" rIns="120189" bIns="60094" rtlCol="0">
-            <a:spAutoFit/>
-          </a:bodyPr>
-          <a:lstStyle/>
-          <a:p>
-            <a:r>
-              <a:rPr lang="en-US" sz="2800" dirty="0" smtClean="0">
-                <a:latin typeface="+mj-lt"/>
-              </a:rPr>
-              <a:t>OPEN SOURCE</a:t>
-            </a:r>
-            <a:endParaRPr lang="en-US" sz="2800" dirty="0">
-              <a:latin typeface="+mj-lt"/>
-            </a:endParaRPr>
-          </a:p>
-        </p:txBody>
-      </p:sp>
-      <p:sp>
-        <p:nvSpPr>
-          <p:cNvPr id="16" name="TextBox 15"/>
-          <p:cNvSpPr txBox="1"/>
-          <p:nvPr/>
-        </p:nvSpPr>
-        <p:spPr>
-          <a:xfrm>
-            <a:off x="7952550" y="6080190"/>
-            <a:ext cx="1539555" cy="490694"/>
-          </a:xfrm>
-          <a:prstGeom prst="rect">
-            <a:avLst/>
-          </a:prstGeom>
-          <a:noFill/>
-        </p:spPr>
-        <p:txBody>
-          <a:bodyPr wrap="none" lIns="120189" tIns="60094" rIns="120189" bIns="60094" rtlCol="0">
-            <a:spAutoFit/>
-          </a:bodyPr>
-          <a:lstStyle/>
-          <a:p>
-            <a:r>
-              <a:rPr lang="en-US" dirty="0" smtClean="0">
-                <a:latin typeface="+mj-lt"/>
-              </a:rPr>
-              <a:t>WE BUILD</a:t>
-            </a:r>
-            <a:endParaRPr lang="en-US" dirty="0">
-              <a:latin typeface="+mj-lt"/>
-            </a:endParaRPr>
-          </a:p>
-        </p:txBody>
-      </p:sp>
-      <p:sp>
-        <p:nvSpPr>
-          <p:cNvPr id="18" name="TextBox 17"/>
-          <p:cNvSpPr txBox="1"/>
-          <p:nvPr/>
-        </p:nvSpPr>
-        <p:spPr>
-          <a:xfrm>
-            <a:off x="160636" y="6046447"/>
-            <a:ext cx="2182359" cy="490694"/>
-          </a:xfrm>
-          <a:prstGeom prst="rect">
-            <a:avLst/>
-          </a:prstGeom>
-          <a:noFill/>
-        </p:spPr>
-        <p:txBody>
-          <a:bodyPr wrap="none" lIns="120189" tIns="60094" rIns="120189" bIns="60094" rtlCol="0">
-            <a:spAutoFit/>
-          </a:bodyPr>
-          <a:lstStyle/>
-          <a:p>
-            <a:r>
-              <a:rPr lang="en-US" dirty="0" smtClean="0">
-                <a:latin typeface="+mj-lt"/>
-              </a:rPr>
-              <a:t>OTHERS BUILD</a:t>
-            </a:r>
-            <a:endParaRPr lang="en-US" dirty="0">
-              <a:latin typeface="+mj-lt"/>
-            </a:endParaRPr>
-          </a:p>
-        </p:txBody>
-      </p:sp>
-      <p:sp>
-        <p:nvSpPr>
-          <p:cNvPr id="19" name="TextBox 18"/>
-          <p:cNvSpPr txBox="1"/>
-          <p:nvPr/>
-        </p:nvSpPr>
-        <p:spPr>
-          <a:xfrm>
-            <a:off x="6076007" y="12186159"/>
-            <a:ext cx="3467967" cy="490694"/>
-          </a:xfrm>
-          <a:prstGeom prst="rect">
-            <a:avLst/>
-          </a:prstGeom>
-          <a:noFill/>
-        </p:spPr>
-        <p:txBody>
-          <a:bodyPr wrap="none" lIns="120189" tIns="60094" rIns="120189" bIns="60094" rtlCol="0">
-            <a:spAutoFit/>
-          </a:bodyPr>
-          <a:lstStyle/>
-          <a:p>
-            <a:r>
-              <a:rPr lang="en-US" dirty="0" smtClean="0">
-                <a:solidFill>
-                  <a:schemeClr val="accent6"/>
-                </a:solidFill>
-                <a:latin typeface="+mj-lt"/>
-              </a:rPr>
-              <a:t>EARLY ALPHA CANVAS</a:t>
-            </a:r>
-            <a:endParaRPr lang="en-US" dirty="0">
-              <a:solidFill>
-                <a:schemeClr val="accent6"/>
-              </a:solidFill>
-              <a:latin typeface="+mj-lt"/>
-            </a:endParaRPr>
-          </a:p>
-        </p:txBody>
-      </p:sp>
     </p:spTree>
     <p:extLst>
       <p:ext uri="{BB962C8B-B14F-4D97-AF65-F5344CB8AC3E}">

</xml_diff>